<commit_message>
Voron Demo + plus some additional examples
</commit_message>
<xml_diff>
--- a/Presentations/Indexes.pptx
+++ b/Presentations/Indexes.pptx
@@ -5,7 +5,7 @@
     <p:sldMasterId id="2147483660" r:id="rId1"/>
   </p:sldMasterIdLst>
   <p:notesMasterIdLst>
-    <p:notesMasterId r:id="rId49"/>
+    <p:notesMasterId r:id="rId48"/>
   </p:notesMasterIdLst>
   <p:sldIdLst>
     <p:sldId id="256" r:id="rId2"/>
@@ -46,15 +46,14 @@
     <p:sldId id="291" r:id="rId37"/>
     <p:sldId id="292" r:id="rId38"/>
     <p:sldId id="293" r:id="rId39"/>
-    <p:sldId id="294" r:id="rId40"/>
-    <p:sldId id="295" r:id="rId41"/>
-    <p:sldId id="296" r:id="rId42"/>
-    <p:sldId id="298" r:id="rId43"/>
-    <p:sldId id="300" r:id="rId44"/>
-    <p:sldId id="299" r:id="rId45"/>
-    <p:sldId id="301" r:id="rId46"/>
-    <p:sldId id="302" r:id="rId47"/>
-    <p:sldId id="297" r:id="rId48"/>
+    <p:sldId id="295" r:id="rId40"/>
+    <p:sldId id="296" r:id="rId41"/>
+    <p:sldId id="298" r:id="rId42"/>
+    <p:sldId id="300" r:id="rId43"/>
+    <p:sldId id="299" r:id="rId44"/>
+    <p:sldId id="301" r:id="rId45"/>
+    <p:sldId id="302" r:id="rId46"/>
+    <p:sldId id="297" r:id="rId47"/>
   </p:sldIdLst>
   <p:sldSz cx="12192000" cy="6858000"/>
   <p:notesSz cx="6858000" cy="9144000"/>
@@ -3362,12 +3361,12 @@
         <a:fontRef idx="minor"/>
       </dsp:style>
       <dsp:txBody>
-        <a:bodyPr spcFirstLastPara="0" vert="horz" wrap="square" lIns="49530" tIns="49530" rIns="49530" bIns="49530" numCol="1" spcCol="1270" anchor="ctr" anchorCtr="0">
+        <a:bodyPr spcFirstLastPara="0" vert="horz" wrap="square" lIns="41910" tIns="41910" rIns="41910" bIns="41910" numCol="1" spcCol="1270" anchor="ctr" anchorCtr="0">
           <a:noAutofit/>
         </a:bodyPr>
         <a:lstStyle/>
         <a:p>
-          <a:pPr lvl="0" algn="ctr" defTabSz="577850">
+          <a:pPr lvl="0" algn="ctr" defTabSz="488950">
             <a:lnSpc>
               <a:spcPct val="90000"/>
             </a:lnSpc>
@@ -3379,10 +3378,10 @@
             </a:spcAft>
           </a:pPr>
           <a:r>
-            <a:rPr lang="en-GB" sz="1300" kern="1200" dirty="0" err="1" smtClean="0"/>
+            <a:rPr lang="en-GB" sz="1100" kern="1200" dirty="0" err="1" smtClean="0"/>
             <a:t>BlogsByTitle</a:t>
           </a:r>
-          <a:endParaRPr lang="en-US" sz="1300" kern="1200" dirty="0"/>
+          <a:endParaRPr lang="en-US" sz="1100" kern="1200" dirty="0"/>
         </a:p>
       </dsp:txBody>
       <dsp:txXfrm>
@@ -3441,12 +3440,12 @@
         </a:fontRef>
       </dsp:style>
       <dsp:txBody>
-        <a:bodyPr spcFirstLastPara="0" vert="horz" wrap="square" lIns="38100" tIns="28575" rIns="38100" bIns="28575" numCol="1" spcCol="1270" anchor="ctr" anchorCtr="0">
+        <a:bodyPr spcFirstLastPara="0" vert="horz" wrap="square" lIns="33020" tIns="24765" rIns="33020" bIns="24765" numCol="1" spcCol="1270" anchor="ctr" anchorCtr="0">
           <a:noAutofit/>
         </a:bodyPr>
         <a:lstStyle/>
         <a:p>
-          <a:pPr lvl="0" algn="ctr" defTabSz="666750">
+          <a:pPr lvl="0" algn="ctr" defTabSz="577850">
             <a:lnSpc>
               <a:spcPct val="90000"/>
             </a:lnSpc>
@@ -3458,10 +3457,10 @@
             </a:spcAft>
           </a:pPr>
           <a:r>
-            <a:rPr lang="en-GB" sz="1500" kern="1200" dirty="0" smtClean="0"/>
+            <a:rPr lang="en-GB" sz="1300" kern="1200" dirty="0" smtClean="0"/>
             <a:t>Title</a:t>
           </a:r>
-          <a:endParaRPr lang="en-US" sz="1500" kern="1200" dirty="0"/>
+          <a:endParaRPr lang="en-US" sz="1300" kern="1200" dirty="0"/>
         </a:p>
       </dsp:txBody>
       <dsp:txXfrm>
@@ -3511,12 +3510,12 @@
         <a:fontRef idx="minor"/>
       </dsp:style>
       <dsp:txBody>
-        <a:bodyPr spcFirstLastPara="0" vert="horz" wrap="square" lIns="49530" tIns="49530" rIns="49530" bIns="49530" numCol="1" spcCol="1270" anchor="ctr" anchorCtr="0">
+        <a:bodyPr spcFirstLastPara="0" vert="horz" wrap="square" lIns="41910" tIns="41910" rIns="41910" bIns="41910" numCol="1" spcCol="1270" anchor="ctr" anchorCtr="0">
           <a:noAutofit/>
         </a:bodyPr>
         <a:lstStyle/>
         <a:p>
-          <a:pPr lvl="0" algn="ctr" defTabSz="577850">
+          <a:pPr lvl="0" algn="ctr" defTabSz="488950">
             <a:lnSpc>
               <a:spcPct val="90000"/>
             </a:lnSpc>
@@ -3528,10 +3527,10 @@
             </a:spcAft>
           </a:pPr>
           <a:r>
-            <a:rPr lang="en-GB" sz="1300" kern="1200" dirty="0" err="1" smtClean="0"/>
+            <a:rPr lang="en-GB" sz="1100" kern="1200" dirty="0" err="1" smtClean="0"/>
             <a:t>UsersByAll</a:t>
           </a:r>
-          <a:endParaRPr lang="en-US" sz="1300" kern="1200" dirty="0"/>
+          <a:endParaRPr lang="en-US" sz="1100" kern="1200" dirty="0"/>
         </a:p>
       </dsp:txBody>
       <dsp:txXfrm>
@@ -3590,12 +3589,12 @@
         </a:fontRef>
       </dsp:style>
       <dsp:txBody>
-        <a:bodyPr spcFirstLastPara="0" vert="horz" wrap="square" lIns="38100" tIns="28575" rIns="38100" bIns="28575" numCol="1" spcCol="1270" anchor="ctr" anchorCtr="0">
+        <a:bodyPr spcFirstLastPara="0" vert="horz" wrap="square" lIns="33020" tIns="24765" rIns="33020" bIns="24765" numCol="1" spcCol="1270" anchor="ctr" anchorCtr="0">
           <a:noAutofit/>
         </a:bodyPr>
         <a:lstStyle/>
         <a:p>
-          <a:pPr lvl="0" algn="ctr" defTabSz="666750">
+          <a:pPr lvl="0" algn="ctr" defTabSz="577850">
             <a:lnSpc>
               <a:spcPct val="90000"/>
             </a:lnSpc>
@@ -3607,10 +3606,10 @@
             </a:spcAft>
           </a:pPr>
           <a:r>
-            <a:rPr lang="en-GB" sz="1500" kern="1200" dirty="0" smtClean="0"/>
+            <a:rPr lang="en-GB" sz="1300" kern="1200" dirty="0" smtClean="0"/>
             <a:t>Username</a:t>
           </a:r>
-          <a:endParaRPr lang="en-US" sz="1500" kern="1200" dirty="0"/>
+          <a:endParaRPr lang="en-US" sz="1300" kern="1200" dirty="0"/>
         </a:p>
       </dsp:txBody>
       <dsp:txXfrm>
@@ -3669,12 +3668,12 @@
         </a:fontRef>
       </dsp:style>
       <dsp:txBody>
-        <a:bodyPr spcFirstLastPara="0" vert="horz" wrap="square" lIns="38100" tIns="28575" rIns="38100" bIns="28575" numCol="1" spcCol="1270" anchor="ctr" anchorCtr="0">
+        <a:bodyPr spcFirstLastPara="0" vert="horz" wrap="square" lIns="33020" tIns="24765" rIns="33020" bIns="24765" numCol="1" spcCol="1270" anchor="ctr" anchorCtr="0">
           <a:noAutofit/>
         </a:bodyPr>
         <a:lstStyle/>
         <a:p>
-          <a:pPr lvl="0" algn="ctr" defTabSz="666750">
+          <a:pPr lvl="0" algn="ctr" defTabSz="577850">
             <a:lnSpc>
               <a:spcPct val="90000"/>
             </a:lnSpc>
@@ -3686,10 +3685,10 @@
             </a:spcAft>
           </a:pPr>
           <a:r>
-            <a:rPr lang="en-GB" sz="1500" kern="1200" dirty="0" err="1" smtClean="0"/>
+            <a:rPr lang="en-GB" sz="1300" kern="1200" dirty="0" err="1" smtClean="0"/>
             <a:t>DateJoined</a:t>
           </a:r>
-          <a:endParaRPr lang="en-US" sz="1500" kern="1200" dirty="0"/>
+          <a:endParaRPr lang="en-US" sz="1300" kern="1200" dirty="0"/>
         </a:p>
       </dsp:txBody>
       <dsp:txXfrm>
@@ -3739,12 +3738,12 @@
         <a:fontRef idx="minor"/>
       </dsp:style>
       <dsp:txBody>
-        <a:bodyPr spcFirstLastPara="0" vert="horz" wrap="square" lIns="49530" tIns="49530" rIns="49530" bIns="49530" numCol="1" spcCol="1270" anchor="ctr" anchorCtr="0">
+        <a:bodyPr spcFirstLastPara="0" vert="horz" wrap="square" lIns="41910" tIns="41910" rIns="41910" bIns="41910" numCol="1" spcCol="1270" anchor="ctr" anchorCtr="0">
           <a:noAutofit/>
         </a:bodyPr>
         <a:lstStyle/>
         <a:p>
-          <a:pPr lvl="0" algn="ctr" defTabSz="577850">
+          <a:pPr lvl="0" algn="ctr" defTabSz="488950">
             <a:lnSpc>
               <a:spcPct val="90000"/>
             </a:lnSpc>
@@ -3756,10 +3755,10 @@
             </a:spcAft>
           </a:pPr>
           <a:r>
-            <a:rPr lang="en-GB" sz="1300" kern="1200" dirty="0" err="1" smtClean="0"/>
+            <a:rPr lang="en-GB" sz="1100" kern="1200" dirty="0" err="1" smtClean="0"/>
             <a:t>BlogsByCategory</a:t>
           </a:r>
-          <a:endParaRPr lang="en-US" sz="1300" kern="1200" dirty="0"/>
+          <a:endParaRPr lang="en-US" sz="1100" kern="1200" dirty="0"/>
         </a:p>
       </dsp:txBody>
       <dsp:txXfrm>
@@ -3818,12 +3817,12 @@
         </a:fontRef>
       </dsp:style>
       <dsp:txBody>
-        <a:bodyPr spcFirstLastPara="0" vert="horz" wrap="square" lIns="38100" tIns="28575" rIns="38100" bIns="28575" numCol="1" spcCol="1270" anchor="ctr" anchorCtr="0">
+        <a:bodyPr spcFirstLastPara="0" vert="horz" wrap="square" lIns="33020" tIns="24765" rIns="33020" bIns="24765" numCol="1" spcCol="1270" anchor="ctr" anchorCtr="0">
           <a:noAutofit/>
         </a:bodyPr>
         <a:lstStyle/>
         <a:p>
-          <a:pPr lvl="0" algn="ctr" defTabSz="666750">
+          <a:pPr lvl="0" algn="ctr" defTabSz="577850">
             <a:lnSpc>
               <a:spcPct val="90000"/>
             </a:lnSpc>
@@ -3835,10 +3834,10 @@
             </a:spcAft>
           </a:pPr>
           <a:r>
-            <a:rPr lang="en-GB" sz="1500" kern="1200" dirty="0" smtClean="0"/>
+            <a:rPr lang="en-GB" sz="1300" kern="1200" dirty="0" smtClean="0"/>
             <a:t>Category</a:t>
           </a:r>
-          <a:endParaRPr lang="en-US" sz="1500" kern="1200" dirty="0"/>
+          <a:endParaRPr lang="en-US" sz="1300" kern="1200" dirty="0"/>
         </a:p>
       </dsp:txBody>
       <dsp:txXfrm>
@@ -3890,12 +3889,12 @@
         <a:fontRef idx="minor"/>
       </dsp:style>
       <dsp:txBody>
-        <a:bodyPr spcFirstLastPara="0" vert="horz" wrap="square" lIns="82550" tIns="82550" rIns="82550" bIns="82550" numCol="1" spcCol="1270" anchor="ctr" anchorCtr="0">
+        <a:bodyPr spcFirstLastPara="0" vert="horz" wrap="square" lIns="67310" tIns="67310" rIns="67310" bIns="67310" numCol="1" spcCol="1270" anchor="ctr" anchorCtr="0">
           <a:noAutofit/>
         </a:bodyPr>
         <a:lstStyle/>
         <a:p>
-          <a:pPr lvl="0" algn="ctr" defTabSz="2889250">
+          <a:pPr lvl="0" algn="ctr" defTabSz="2355850">
             <a:lnSpc>
               <a:spcPct val="90000"/>
             </a:lnSpc>
@@ -3907,10 +3906,10 @@
             </a:spcAft>
           </a:pPr>
           <a:r>
-            <a:rPr lang="en-US" sz="6500" kern="1200" dirty="0" smtClean="0"/>
+            <a:rPr lang="en-US" sz="5300" kern="1200" dirty="0" smtClean="0"/>
             <a:t> </a:t>
           </a:r>
-          <a:endParaRPr lang="en-US" sz="6500" kern="1200" dirty="0"/>
+          <a:endParaRPr lang="en-US" sz="5300" kern="1200" dirty="0"/>
         </a:p>
       </dsp:txBody>
       <dsp:txXfrm>
@@ -4005,12 +4004,12 @@
         <a:fontRef idx="minor"/>
       </dsp:style>
       <dsp:txBody>
-        <a:bodyPr spcFirstLastPara="0" vert="horz" wrap="square" lIns="82550" tIns="82550" rIns="82550" bIns="82550" numCol="1" spcCol="1270" anchor="ctr" anchorCtr="0">
+        <a:bodyPr spcFirstLastPara="0" vert="horz" wrap="square" lIns="67310" tIns="67310" rIns="67310" bIns="67310" numCol="1" spcCol="1270" anchor="ctr" anchorCtr="0">
           <a:noAutofit/>
         </a:bodyPr>
         <a:lstStyle/>
         <a:p>
-          <a:pPr lvl="0" algn="ctr" defTabSz="2889250">
+          <a:pPr lvl="0" algn="ctr" defTabSz="2355850">
             <a:lnSpc>
               <a:spcPct val="90000"/>
             </a:lnSpc>
@@ -4022,10 +4021,10 @@
             </a:spcAft>
           </a:pPr>
           <a:r>
-            <a:rPr lang="en-US" sz="6500" kern="1200" dirty="0" smtClean="0"/>
+            <a:rPr lang="en-US" sz="5300" kern="1200" dirty="0" smtClean="0"/>
             <a:t> </a:t>
           </a:r>
-          <a:endParaRPr lang="en-US" sz="6500" kern="1200" dirty="0"/>
+          <a:endParaRPr lang="en-US" sz="5300" kern="1200" dirty="0"/>
         </a:p>
       </dsp:txBody>
       <dsp:txXfrm>
@@ -4120,12 +4119,12 @@
         <a:fontRef idx="minor"/>
       </dsp:style>
       <dsp:txBody>
-        <a:bodyPr spcFirstLastPara="0" vert="horz" wrap="square" lIns="82550" tIns="82550" rIns="82550" bIns="82550" numCol="1" spcCol="1270" anchor="ctr" anchorCtr="0">
+        <a:bodyPr spcFirstLastPara="0" vert="horz" wrap="square" lIns="67310" tIns="67310" rIns="67310" bIns="67310" numCol="1" spcCol="1270" anchor="ctr" anchorCtr="0">
           <a:noAutofit/>
         </a:bodyPr>
         <a:lstStyle/>
         <a:p>
-          <a:pPr lvl="0" algn="ctr" defTabSz="2889250">
+          <a:pPr lvl="0" algn="ctr" defTabSz="2355850">
             <a:lnSpc>
               <a:spcPct val="90000"/>
             </a:lnSpc>
@@ -4137,10 +4136,10 @@
             </a:spcAft>
           </a:pPr>
           <a:r>
-            <a:rPr lang="en-US" sz="6500" kern="1200" dirty="0" smtClean="0"/>
+            <a:rPr lang="en-US" sz="5300" kern="1200" dirty="0" smtClean="0"/>
             <a:t> </a:t>
           </a:r>
-          <a:endParaRPr lang="en-US" sz="6500" kern="1200" dirty="0"/>
+          <a:endParaRPr lang="en-US" sz="5300" kern="1200" dirty="0"/>
         </a:p>
       </dsp:txBody>
       <dsp:txXfrm>
@@ -4316,12 +4315,12 @@
         </a:fontRef>
       </dsp:style>
       <dsp:txBody>
-        <a:bodyPr spcFirstLastPara="0" vert="horz" wrap="square" lIns="72390" tIns="36195" rIns="72390" bIns="36195" numCol="1" spcCol="1270" anchor="ctr" anchorCtr="0">
+        <a:bodyPr spcFirstLastPara="0" vert="horz" wrap="square" lIns="57150" tIns="28575" rIns="57150" bIns="28575" numCol="1" spcCol="1270" anchor="ctr" anchorCtr="0">
           <a:noAutofit/>
         </a:bodyPr>
         <a:lstStyle/>
         <a:p>
-          <a:pPr lvl="0" algn="ctr" defTabSz="844550">
+          <a:pPr lvl="0" algn="ctr" defTabSz="666750">
             <a:lnSpc>
               <a:spcPct val="90000"/>
             </a:lnSpc>
@@ -4333,10 +4332,10 @@
             </a:spcAft>
           </a:pPr>
           <a:r>
-            <a:rPr lang="en-GB" sz="1900" kern="1200" dirty="0" smtClean="0"/>
+            <a:rPr lang="en-GB" sz="1500" kern="1200" dirty="0" smtClean="0"/>
             <a:t>Documents</a:t>
           </a:r>
-          <a:endParaRPr lang="en-US" sz="1900" kern="1200" dirty="0"/>
+          <a:endParaRPr lang="en-US" sz="1500" kern="1200" dirty="0"/>
         </a:p>
       </dsp:txBody>
       <dsp:txXfrm>
@@ -8992,11 +8991,19 @@
           <a:p>
             <a:r>
               <a:rPr lang="en-US" dirty="0" smtClean="0"/>
-              <a:t>Don’t forget to mention that suggestions</a:t>
-            </a:r>
-            <a:r>
-              <a:rPr lang="en-US" baseline="0" dirty="0" smtClean="0"/>
-              <a:t> is expensive!</a:t>
+              <a:t>Data </a:t>
+            </a:r>
+            <a:r>
+              <a:rPr lang="en-US" dirty="0" smtClean="0">
+                <a:sym typeface="Wingdings" panose="05000000000000000000" pitchFamily="2" charset="2"/>
+              </a:rPr>
+              <a:t> analyzer (tokenize into terms)</a:t>
+            </a:r>
+            <a:r>
+              <a:rPr lang="en-US" baseline="0" dirty="0" smtClean="0">
+                <a:sym typeface="Wingdings" panose="05000000000000000000" pitchFamily="2" charset="2"/>
+              </a:rPr>
+              <a:t>  stemming  store in the index</a:t>
             </a:r>
             <a:endParaRPr lang="en-US" dirty="0"/>
           </a:p>
@@ -9019,6 +9026,200 @@
           <a:p>
             <a:fld id="{2121A2FB-CCE0-45C8-A866-0CB48D36A35C}" type="slidenum">
               <a:rPr lang="en-US" smtClean="0"/>
+              <a:t>34</a:t>
+            </a:fld>
+            <a:endParaRPr lang="en-US"/>
+          </a:p>
+        </p:txBody>
+      </p:sp>
+    </p:spTree>
+    <p:extLst>
+      <p:ext uri="{BB962C8B-B14F-4D97-AF65-F5344CB8AC3E}">
+        <p14:creationId xmlns:p14="http://schemas.microsoft.com/office/powerpoint/2010/main" val="100134496"/>
+      </p:ext>
+    </p:extLst>
+  </p:cSld>
+  <p:clrMapOvr>
+    <a:masterClrMapping/>
+  </p:clrMapOvr>
+</p:notes>
+</file>
+
+<file path=ppt/notesSlides/notesSlide6.xml><?xml version="1.0" encoding="utf-8"?>
+<p:notes xmlns:a="http://schemas.openxmlformats.org/drawingml/2006/main" xmlns:r="http://schemas.openxmlformats.org/officeDocument/2006/relationships" xmlns:p="http://schemas.openxmlformats.org/presentationml/2006/main">
+  <p:cSld>
+    <p:spTree>
+      <p:nvGrpSpPr>
+        <p:cNvPr id="1" name=""/>
+        <p:cNvGrpSpPr/>
+        <p:nvPr/>
+      </p:nvGrpSpPr>
+      <p:grpSpPr>
+        <a:xfrm>
+          <a:off x="0" y="0"/>
+          <a:ext cx="0" cy="0"/>
+          <a:chOff x="0" y="0"/>
+          <a:chExt cx="0" cy="0"/>
+        </a:xfrm>
+      </p:grpSpPr>
+      <p:sp>
+        <p:nvSpPr>
+          <p:cNvPr id="2" name="Slide Image Placeholder 1"/>
+          <p:cNvSpPr>
+            <a:spLocks noGrp="1" noRot="1" noChangeAspect="1"/>
+          </p:cNvSpPr>
+          <p:nvPr>
+            <p:ph type="sldImg"/>
+          </p:nvPr>
+        </p:nvSpPr>
+        <p:spPr/>
+      </p:sp>
+      <p:sp>
+        <p:nvSpPr>
+          <p:cNvPr id="3" name="Notes Placeholder 2"/>
+          <p:cNvSpPr>
+            <a:spLocks noGrp="1"/>
+          </p:cNvSpPr>
+          <p:nvPr>
+            <p:ph type="body" idx="1"/>
+          </p:nvPr>
+        </p:nvSpPr>
+        <p:spPr/>
+        <p:txBody>
+          <a:bodyPr/>
+          <a:lstStyle/>
+          <a:p>
+            <a:r>
+              <a:rPr lang="en-US" dirty="0" smtClean="0"/>
+              <a:t>Do not forget to mention </a:t>
+            </a:r>
+            <a:r>
+              <a:rPr lang="en-US" dirty="0" smtClean="0">
+                <a:sym typeface="Wingdings" panose="05000000000000000000" pitchFamily="2" charset="2"/>
+              </a:rPr>
+              <a:t> s</a:t>
+            </a:r>
+            <a:r>
+              <a:rPr lang="en-US" dirty="0" smtClean="0"/>
+              <a:t>top words</a:t>
+            </a:r>
+            <a:r>
+              <a:rPr lang="en-US" baseline="0" dirty="0" smtClean="0"/>
+              <a:t> do not participate in search!</a:t>
+            </a:r>
+            <a:endParaRPr lang="en-US" dirty="0"/>
+          </a:p>
+        </p:txBody>
+      </p:sp>
+      <p:sp>
+        <p:nvSpPr>
+          <p:cNvPr id="4" name="Slide Number Placeholder 3"/>
+          <p:cNvSpPr>
+            <a:spLocks noGrp="1"/>
+          </p:cNvSpPr>
+          <p:nvPr>
+            <p:ph type="sldNum" sz="quarter" idx="10"/>
+          </p:nvPr>
+        </p:nvSpPr>
+        <p:spPr/>
+        <p:txBody>
+          <a:bodyPr/>
+          <a:lstStyle/>
+          <a:p>
+            <a:fld id="{2121A2FB-CCE0-45C8-A866-0CB48D36A35C}" type="slidenum">
+              <a:rPr lang="en-US" smtClean="0"/>
+              <a:t>37</a:t>
+            </a:fld>
+            <a:endParaRPr lang="en-US"/>
+          </a:p>
+        </p:txBody>
+      </p:sp>
+    </p:spTree>
+    <p:extLst>
+      <p:ext uri="{BB962C8B-B14F-4D97-AF65-F5344CB8AC3E}">
+        <p14:creationId xmlns:p14="http://schemas.microsoft.com/office/powerpoint/2010/main" val="2581335209"/>
+      </p:ext>
+    </p:extLst>
+  </p:cSld>
+  <p:clrMapOvr>
+    <a:masterClrMapping/>
+  </p:clrMapOvr>
+</p:notes>
+</file>
+
+<file path=ppt/notesSlides/notesSlide7.xml><?xml version="1.0" encoding="utf-8"?>
+<p:notes xmlns:a="http://schemas.openxmlformats.org/drawingml/2006/main" xmlns:r="http://schemas.openxmlformats.org/officeDocument/2006/relationships" xmlns:p="http://schemas.openxmlformats.org/presentationml/2006/main">
+  <p:cSld>
+    <p:spTree>
+      <p:nvGrpSpPr>
+        <p:cNvPr id="1" name=""/>
+        <p:cNvGrpSpPr/>
+        <p:nvPr/>
+      </p:nvGrpSpPr>
+      <p:grpSpPr>
+        <a:xfrm>
+          <a:off x="0" y="0"/>
+          <a:ext cx="0" cy="0"/>
+          <a:chOff x="0" y="0"/>
+          <a:chExt cx="0" cy="0"/>
+        </a:xfrm>
+      </p:grpSpPr>
+      <p:sp>
+        <p:nvSpPr>
+          <p:cNvPr id="2" name="Slide Image Placeholder 1"/>
+          <p:cNvSpPr>
+            <a:spLocks noGrp="1" noRot="1" noChangeAspect="1"/>
+          </p:cNvSpPr>
+          <p:nvPr>
+            <p:ph type="sldImg"/>
+          </p:nvPr>
+        </p:nvSpPr>
+        <p:spPr/>
+      </p:sp>
+      <p:sp>
+        <p:nvSpPr>
+          <p:cNvPr id="3" name="Notes Placeholder 2"/>
+          <p:cNvSpPr>
+            <a:spLocks noGrp="1"/>
+          </p:cNvSpPr>
+          <p:nvPr>
+            <p:ph type="body" idx="1"/>
+          </p:nvPr>
+        </p:nvSpPr>
+        <p:spPr/>
+        <p:txBody>
+          <a:bodyPr/>
+          <a:lstStyle/>
+          <a:p>
+            <a:r>
+              <a:rPr lang="en-US" dirty="0" smtClean="0"/>
+              <a:t>Don’t forget to mention that suggestions</a:t>
+            </a:r>
+            <a:r>
+              <a:rPr lang="en-US" baseline="0" dirty="0" smtClean="0"/>
+              <a:t> is expensive!</a:t>
+            </a:r>
+            <a:endParaRPr lang="en-US" dirty="0"/>
+          </a:p>
+        </p:txBody>
+      </p:sp>
+      <p:sp>
+        <p:nvSpPr>
+          <p:cNvPr id="4" name="Slide Number Placeholder 3"/>
+          <p:cNvSpPr>
+            <a:spLocks noGrp="1"/>
+          </p:cNvSpPr>
+          <p:nvPr>
+            <p:ph type="sldNum" sz="quarter" idx="10"/>
+          </p:nvPr>
+        </p:nvSpPr>
+        <p:spPr/>
+        <p:txBody>
+          <a:bodyPr/>
+          <a:lstStyle/>
+          <a:p>
+            <a:fld id="{2121A2FB-CCE0-45C8-A866-0CB48D36A35C}" type="slidenum">
+              <a:rPr lang="en-US" smtClean="0"/>
               <a:t>38</a:t>
             </a:fld>
             <a:endParaRPr lang="en-US"/>
@@ -9029,6 +9230,106 @@
     <p:extLst>
       <p:ext uri="{BB962C8B-B14F-4D97-AF65-F5344CB8AC3E}">
         <p14:creationId xmlns:p14="http://schemas.microsoft.com/office/powerpoint/2010/main" val="2676853201"/>
+      </p:ext>
+    </p:extLst>
+  </p:cSld>
+  <p:clrMapOvr>
+    <a:masterClrMapping/>
+  </p:clrMapOvr>
+</p:notes>
+</file>
+
+<file path=ppt/notesSlides/notesSlide8.xml><?xml version="1.0" encoding="utf-8"?>
+<p:notes xmlns:a="http://schemas.openxmlformats.org/drawingml/2006/main" xmlns:r="http://schemas.openxmlformats.org/officeDocument/2006/relationships" xmlns:p="http://schemas.openxmlformats.org/presentationml/2006/main">
+  <p:cSld>
+    <p:spTree>
+      <p:nvGrpSpPr>
+        <p:cNvPr id="1" name=""/>
+        <p:cNvGrpSpPr/>
+        <p:nvPr/>
+      </p:nvGrpSpPr>
+      <p:grpSpPr>
+        <a:xfrm>
+          <a:off x="0" y="0"/>
+          <a:ext cx="0" cy="0"/>
+          <a:chOff x="0" y="0"/>
+          <a:chExt cx="0" cy="0"/>
+        </a:xfrm>
+      </p:grpSpPr>
+      <p:sp>
+        <p:nvSpPr>
+          <p:cNvPr id="2" name="Slide Image Placeholder 1"/>
+          <p:cNvSpPr>
+            <a:spLocks noGrp="1" noRot="1" noChangeAspect="1"/>
+          </p:cNvSpPr>
+          <p:nvPr>
+            <p:ph type="sldImg"/>
+          </p:nvPr>
+        </p:nvSpPr>
+        <p:spPr/>
+      </p:sp>
+      <p:sp>
+        <p:nvSpPr>
+          <p:cNvPr id="3" name="Notes Placeholder 2"/>
+          <p:cNvSpPr>
+            <a:spLocks noGrp="1"/>
+          </p:cNvSpPr>
+          <p:nvPr>
+            <p:ph type="body" idx="1"/>
+          </p:nvPr>
+        </p:nvSpPr>
+        <p:spPr/>
+        <p:txBody>
+          <a:bodyPr/>
+          <a:lstStyle/>
+          <a:p>
+            <a:r>
+              <a:rPr lang="en-US" dirty="0" smtClean="0"/>
+              <a:t>Note </a:t>
+            </a:r>
+            <a:r>
+              <a:rPr lang="en-US" dirty="0" smtClean="0">
+                <a:sym typeface="Wingdings" panose="05000000000000000000" pitchFamily="2" charset="2"/>
+              </a:rPr>
+              <a:t> default prefix tree index is 9 (resolution of how accurate the indexing will</a:t>
+            </a:r>
+            <a:r>
+              <a:rPr lang="en-US" baseline="0" dirty="0" smtClean="0">
+                <a:sym typeface="Wingdings" panose="05000000000000000000" pitchFamily="2" charset="2"/>
+              </a:rPr>
+              <a:t> be)</a:t>
+            </a:r>
+            <a:endParaRPr lang="en-US" dirty="0"/>
+          </a:p>
+        </p:txBody>
+      </p:sp>
+      <p:sp>
+        <p:nvSpPr>
+          <p:cNvPr id="4" name="Slide Number Placeholder 3"/>
+          <p:cNvSpPr>
+            <a:spLocks noGrp="1"/>
+          </p:cNvSpPr>
+          <p:nvPr>
+            <p:ph type="sldNum" sz="quarter" idx="10"/>
+          </p:nvPr>
+        </p:nvSpPr>
+        <p:spPr/>
+        <p:txBody>
+          <a:bodyPr/>
+          <a:lstStyle/>
+          <a:p>
+            <a:fld id="{2121A2FB-CCE0-45C8-A866-0CB48D36A35C}" type="slidenum">
+              <a:rPr lang="en-US" smtClean="0"/>
+              <a:t>43</a:t>
+            </a:fld>
+            <a:endParaRPr lang="en-US"/>
+          </a:p>
+        </p:txBody>
+      </p:sp>
+    </p:spTree>
+    <p:extLst>
+      <p:ext uri="{BB962C8B-B14F-4D97-AF65-F5344CB8AC3E}">
+        <p14:creationId xmlns:p14="http://schemas.microsoft.com/office/powerpoint/2010/main" val="1361790036"/>
       </p:ext>
     </p:extLst>
   </p:cSld>
@@ -15426,7 +15727,7 @@
                 <a:latin typeface="Consolas" pitchFamily="49" charset="0"/>
                 <a:cs typeface="Consolas" pitchFamily="49" charset="0"/>
               </a:rPr>
-              <a:t>doc.User</a:t>
+              <a:t>doc.Name</a:t>
             </a:r>
             <a:r>
               <a:rPr lang="en-GB" b="1" dirty="0" smtClean="0">
@@ -15488,12 +15789,16 @@
             <a:graphicFrameLocks noGrp="1"/>
           </p:cNvGraphicFramePr>
           <p:nvPr>
-            <p:extLst/>
+            <p:extLst>
+              <p:ext uri="{D42A27DB-BD31-4B8C-83A1-F6EECF244321}">
+                <p14:modId xmlns:p14="http://schemas.microsoft.com/office/powerpoint/2010/main" val="1995287405"/>
+              </p:ext>
+            </p:extLst>
           </p:nvPr>
         </p:nvGraphicFramePr>
         <p:xfrm>
-          <a:off x="6087601" y="4974761"/>
-          <a:ext cx="4283970" cy="1833880"/>
+          <a:off x="6196783" y="4279990"/>
+          <a:ext cx="5185449" cy="1833880"/>
         </p:xfrm>
         <a:graphic>
           <a:graphicData uri="http://schemas.openxmlformats.org/drawingml/2006/table">
@@ -15502,9 +15807,9 @@
                 <a:tableStyleId>{5C22544A-7EE6-4342-B048-85BDC9FD1C3A}</a:tableStyleId>
               </a:tblPr>
               <a:tblGrid>
-                <a:gridCol w="1728193"/>
-                <a:gridCol w="1127787"/>
-                <a:gridCol w="1427990"/>
+                <a:gridCol w="2091858"/>
+                <a:gridCol w="1365108"/>
+                <a:gridCol w="1728483"/>
               </a:tblGrid>
               <a:tr h="370840">
                 <a:tc>
@@ -15532,7 +15837,7 @@
                     <a:p>
                       <a:r>
                         <a:rPr lang="en-US" dirty="0" smtClean="0"/>
-                        <a:t>User</a:t>
+                        <a:t>Name</a:t>
                       </a:r>
                       <a:endParaRPr lang="en-US" dirty="0"/>
                     </a:p>
@@ -15698,7 +16003,7 @@
         </p:nvSpPr>
         <p:spPr>
           <a:xfrm>
-            <a:off x="2855640" y="2067814"/>
+            <a:off x="2841993" y="1910422"/>
             <a:ext cx="6840760" cy="2585323"/>
           </a:xfrm>
           <a:prstGeom prst="rect">
@@ -15720,7 +16025,15 @@
           <a:p>
             <a:r>
               <a:rPr lang="en-US" dirty="0"/>
-              <a:t>	'User': 'Oren </a:t>
+              <a:t>	</a:t>
+            </a:r>
+            <a:r>
+              <a:rPr lang="en-US" dirty="0" smtClean="0"/>
+              <a:t>‘Name': </a:t>
+            </a:r>
+            <a:r>
+              <a:rPr lang="en-US" dirty="0"/>
+              <a:t>'Oren </a:t>
             </a:r>
             <a:r>
               <a:rPr lang="en-US" dirty="0" err="1"/>
@@ -16208,6 +16521,30 @@
           <a:chExt cx="0" cy="0"/>
         </a:xfrm>
       </p:grpSpPr>
+      <p:pic>
+        <p:nvPicPr>
+          <p:cNvPr id="7" name="Picture 6"/>
+          <p:cNvPicPr>
+            <a:picLocks noChangeAspect="1"/>
+          </p:cNvPicPr>
+          <p:nvPr/>
+        </p:nvPicPr>
+        <p:blipFill>
+          <a:blip r:embed="rId2"/>
+          <a:stretch>
+            <a:fillRect/>
+          </a:stretch>
+        </p:blipFill>
+        <p:spPr>
+          <a:xfrm>
+            <a:off x="336061" y="2000087"/>
+            <a:ext cx="7251229" cy="4185937"/>
+          </a:xfrm>
+          <a:prstGeom prst="rect">
+            <a:avLst/>
+          </a:prstGeom>
+        </p:spPr>
+      </p:pic>
       <p:sp>
         <p:nvSpPr>
           <p:cNvPr id="2" name="Title 1"/>
@@ -16231,32 +16568,6 @@
           </a:p>
         </p:txBody>
       </p:sp>
-      <p:pic>
-        <p:nvPicPr>
-          <p:cNvPr id="4" name="Content Placeholder 3"/>
-          <p:cNvPicPr>
-            <a:picLocks noGrp="1" noChangeAspect="1"/>
-          </p:cNvPicPr>
-          <p:nvPr>
-            <p:ph sz="quarter" idx="13"/>
-          </p:nvPr>
-        </p:nvPicPr>
-        <p:blipFill>
-          <a:blip r:embed="rId2"/>
-          <a:stretch>
-            <a:fillRect/>
-          </a:stretch>
-        </p:blipFill>
-        <p:spPr>
-          <a:xfrm>
-            <a:off x="739471" y="1881934"/>
-            <a:ext cx="6887405" cy="4486816"/>
-          </a:xfrm>
-          <a:prstGeom prst="rect">
-            <a:avLst/>
-          </a:prstGeom>
-        </p:spPr>
-      </p:pic>
       <p:sp>
         <p:nvSpPr>
           <p:cNvPr id="5" name="Rectangle 4"/>
@@ -16265,7 +16576,7 @@
         </p:nvSpPr>
         <p:spPr>
           <a:xfrm>
-            <a:off x="4171428" y="2967335"/>
+            <a:off x="5740921" y="2869226"/>
             <a:ext cx="3419782" cy="1754326"/>
           </a:xfrm>
           <a:prstGeom prst="rect">
@@ -16468,7 +16779,15 @@
           <a:p>
             <a:r>
               <a:rPr lang="en-US" dirty="0"/>
-              <a:t>	'User': 'Oren </a:t>
+              <a:t>	</a:t>
+            </a:r>
+            <a:r>
+              <a:rPr lang="en-US" dirty="0" smtClean="0"/>
+              <a:t>‘Name': </a:t>
+            </a:r>
+            <a:r>
+              <a:rPr lang="en-US" dirty="0"/>
+              <a:t>'Oren </a:t>
             </a:r>
             <a:r>
               <a:rPr lang="en-US" dirty="0" err="1"/>
@@ -16628,7 +16947,7 @@
                 <a:latin typeface="Consolas" pitchFamily="49" charset="0"/>
                 <a:cs typeface="Consolas" pitchFamily="49" charset="0"/>
               </a:rPr>
-              <a:t>doc.User</a:t>
+              <a:t>doc.Name</a:t>
             </a:r>
             <a:r>
               <a:rPr lang="en-GB" b="1" dirty="0" smtClean="0">
@@ -16665,14 +16984,7 @@
                 <a:latin typeface="Consolas" pitchFamily="49" charset="0"/>
                 <a:cs typeface="Consolas" pitchFamily="49" charset="0"/>
               </a:rPr>
-              <a:t>(x</a:t>
-            </a:r>
-            <a:r>
-              <a:rPr lang="en-GB" b="1" dirty="0" smtClean="0">
-                <a:latin typeface="Consolas" pitchFamily="49" charset="0"/>
-                <a:cs typeface="Consolas" pitchFamily="49" charset="0"/>
-              </a:rPr>
-              <a:t>=&gt;</a:t>
+              <a:t>(x=&gt;</a:t>
             </a:r>
             <a:r>
               <a:rPr lang="en-GB" b="1" dirty="0" err="1" smtClean="0">
@@ -16746,12 +17058,16 @@
             <a:graphicFrameLocks noGrp="1"/>
           </p:cNvGraphicFramePr>
           <p:nvPr>
-            <p:extLst/>
+            <p:extLst>
+              <p:ext uri="{D42A27DB-BD31-4B8C-83A1-F6EECF244321}">
+                <p14:modId xmlns:p14="http://schemas.microsoft.com/office/powerpoint/2010/main" val="193894977"/>
+              </p:ext>
+            </p:extLst>
           </p:nvPr>
         </p:nvGraphicFramePr>
         <p:xfrm>
-          <a:off x="5859487" y="5098898"/>
-          <a:ext cx="4784838" cy="736600"/>
+          <a:off x="7060490" y="3911543"/>
+          <a:ext cx="4784838" cy="1280160"/>
         </p:xfrm>
         <a:graphic>
           <a:graphicData uri="http://schemas.openxmlformats.org/drawingml/2006/table">
@@ -16791,7 +17107,7 @@
                     <a:p>
                       <a:r>
                         <a:rPr lang="en-US" dirty="0" smtClean="0"/>
-                        <a:t>User</a:t>
+                        <a:t>Name</a:t>
                       </a:r>
                       <a:endParaRPr lang="en-US" dirty="0"/>
                     </a:p>
@@ -17521,17 +17837,27 @@
               <a:buNone/>
             </a:pPr>
             <a:r>
-              <a:rPr lang="en-US" sz="1800" dirty="0" err="1">
+              <a:rPr lang="en-US" sz="1800" cap="none" dirty="0" err="1" smtClean="0">
                 <a:solidFill>
                   <a:srgbClr val="000000"/>
                 </a:solidFill>
                 <a:latin typeface="Consolas" pitchFamily="49" charset="0"/>
                 <a:cs typeface="Consolas" pitchFamily="49" charset="0"/>
               </a:rPr>
-              <a:t>RavenQueryStatistics</a:t>
-            </a:r>
-            <a:r>
-              <a:rPr lang="en-US" sz="1800" dirty="0">
+              <a:t>R</a:t>
+            </a:r>
+            <a:r>
+              <a:rPr lang="en-US" sz="1800" cap="none" dirty="0" err="1" smtClean="0">
+                <a:solidFill>
+                  <a:srgbClr val="000000"/>
+                </a:solidFill>
+                <a:latin typeface="Consolas" pitchFamily="49" charset="0"/>
+                <a:cs typeface="Consolas" pitchFamily="49" charset="0"/>
+              </a:rPr>
+              <a:t>avenQueryStatistics</a:t>
+            </a:r>
+            <a:r>
+              <a:rPr lang="en-US" sz="1800" cap="none" dirty="0" smtClean="0">
                 <a:solidFill>
                   <a:srgbClr val="000000"/>
                 </a:solidFill>
@@ -17547,7 +17873,7 @@
               <a:buNone/>
             </a:pPr>
             <a:r>
-              <a:rPr lang="en-US" sz="1800" dirty="0" err="1">
+              <a:rPr lang="en-US" sz="1800" cap="none" dirty="0" err="1" smtClean="0">
                 <a:solidFill>
                   <a:srgbClr val="000000"/>
                 </a:solidFill>
@@ -17557,7 +17883,7 @@
               <a:t>var</a:t>
             </a:r>
             <a:r>
-              <a:rPr lang="en-US" sz="1800" dirty="0">
+              <a:rPr lang="en-US" sz="1800" cap="none" dirty="0" smtClean="0">
                 <a:solidFill>
                   <a:srgbClr val="000000"/>
                 </a:solidFill>
@@ -17567,7 +17893,7 @@
               <a:t> results = </a:t>
             </a:r>
             <a:r>
-              <a:rPr lang="en-US" sz="1800" dirty="0" err="1" smtClean="0">
+              <a:rPr lang="en-US" sz="1800" cap="none" dirty="0" err="1" smtClean="0">
                 <a:solidFill>
                   <a:srgbClr val="000000"/>
                 </a:solidFill>
@@ -17577,7 +17903,7 @@
               <a:t>session.Query</a:t>
             </a:r>
             <a:r>
-              <a:rPr lang="en-US" sz="1800" dirty="0" smtClean="0">
+              <a:rPr lang="en-US" sz="1800" cap="none" dirty="0" smtClean="0">
                 <a:solidFill>
                   <a:srgbClr val="000000"/>
                 </a:solidFill>
@@ -17586,7 +17912,7 @@
               </a:rPr>
               <a:t>&lt;User&gt;()</a:t>
             </a:r>
-            <a:endParaRPr lang="en-US" sz="1800" dirty="0">
+            <a:endParaRPr lang="en-US" sz="1800" cap="none" dirty="0" smtClean="0">
               <a:solidFill>
                 <a:srgbClr val="404040"/>
               </a:solidFill>
@@ -17600,7 +17926,7 @@
               <a:buNone/>
             </a:pPr>
             <a:r>
-              <a:rPr lang="en-US" sz="1800" dirty="0">
+              <a:rPr lang="en-US" sz="1800" cap="none" dirty="0" smtClean="0">
                 <a:solidFill>
                   <a:srgbClr val="404040"/>
                 </a:solidFill>
@@ -17609,7 +17935,7 @@
               <a:t>    </a:t>
             </a:r>
             <a:r>
-              <a:rPr lang="en-US" sz="1800" dirty="0">
+              <a:rPr lang="en-US" sz="1800" cap="none" dirty="0" smtClean="0">
                 <a:solidFill>
                   <a:srgbClr val="000000"/>
                 </a:solidFill>
@@ -17619,7 +17945,7 @@
               <a:t>.Statistics(</a:t>
             </a:r>
             <a:r>
-              <a:rPr lang="en-US" sz="1800" b="1" dirty="0">
+              <a:rPr lang="en-US" sz="1800" b="1" cap="none" dirty="0" smtClean="0">
                 <a:solidFill>
                   <a:srgbClr val="006699"/>
                 </a:solidFill>
@@ -17629,7 +17955,7 @@
               <a:t>out</a:t>
             </a:r>
             <a:r>
-              <a:rPr lang="en-US" sz="1800" dirty="0">
+              <a:rPr lang="en-US" sz="1800" cap="none" dirty="0" smtClean="0">
                 <a:solidFill>
                   <a:srgbClr val="404040"/>
                 </a:solidFill>
@@ -17639,7 +17965,7 @@
               <a:t> </a:t>
             </a:r>
             <a:r>
-              <a:rPr lang="en-US" sz="1800" dirty="0">
+              <a:rPr lang="en-US" sz="1800" cap="none" dirty="0" smtClean="0">
                 <a:solidFill>
                   <a:srgbClr val="000000"/>
                 </a:solidFill>
@@ -17648,7 +17974,7 @@
               </a:rPr>
               <a:t>stats)</a:t>
             </a:r>
-            <a:endParaRPr lang="en-US" sz="1800" dirty="0">
+            <a:endParaRPr lang="en-US" sz="1800" cap="none" dirty="0" smtClean="0">
               <a:solidFill>
                 <a:srgbClr val="404040"/>
               </a:solidFill>
@@ -17662,7 +17988,7 @@
               <a:buNone/>
             </a:pPr>
             <a:r>
-              <a:rPr lang="en-US" sz="1800" dirty="0">
+              <a:rPr lang="en-US" sz="1800" cap="none" dirty="0" smtClean="0">
                 <a:solidFill>
                   <a:srgbClr val="404040"/>
                 </a:solidFill>
@@ -17671,7 +17997,7 @@
               <a:t>    </a:t>
             </a:r>
             <a:r>
-              <a:rPr lang="en-US" sz="1800" dirty="0">
+              <a:rPr lang="en-US" sz="1800" cap="none" dirty="0" smtClean="0">
                 <a:solidFill>
                   <a:srgbClr val="000000"/>
                 </a:solidFill>
@@ -17681,17 +18007,147 @@
               <a:t>.Where(x =&gt; </a:t>
             </a:r>
             <a:r>
-              <a:rPr lang="en-US" sz="1800" dirty="0" err="1" smtClean="0">
+              <a:rPr lang="en-US" sz="1800" cap="none" dirty="0" err="1" smtClean="0">
                 <a:solidFill>
                   <a:srgbClr val="000000"/>
                 </a:solidFill>
                 <a:latin typeface="Consolas" pitchFamily="49" charset="0"/>
                 <a:cs typeface="Consolas" pitchFamily="49" charset="0"/>
               </a:rPr>
-              <a:t>x.User</a:t>
-            </a:r>
-            <a:r>
-              <a:rPr lang="en-US" sz="1800" dirty="0" smtClean="0">
+              <a:t>x.Name</a:t>
+            </a:r>
+            <a:r>
+              <a:rPr lang="en-US" sz="1800" cap="none" dirty="0" smtClean="0">
+                <a:solidFill>
+                  <a:srgbClr val="000000"/>
+                </a:solidFill>
+                <a:latin typeface="Consolas" pitchFamily="49" charset="0"/>
+                <a:cs typeface="Consolas" pitchFamily="49" charset="0"/>
+              </a:rPr>
+              <a:t> == </a:t>
+            </a:r>
+            <a:r>
+              <a:rPr lang="en-US" sz="1800" cap="none" dirty="0" smtClean="0">
+                <a:solidFill>
+                  <a:srgbClr val="0000FF"/>
+                </a:solidFill>
+                <a:latin typeface="Consolas" pitchFamily="49" charset="0"/>
+                <a:cs typeface="Consolas" pitchFamily="49" charset="0"/>
+              </a:rPr>
+              <a:t>“</a:t>
+            </a:r>
+            <a:r>
+              <a:rPr lang="en-US" sz="1800" cap="none" dirty="0" err="1" smtClean="0">
+                <a:solidFill>
+                  <a:srgbClr val="0000FF"/>
+                </a:solidFill>
+                <a:latin typeface="Consolas" pitchFamily="49" charset="0"/>
+                <a:cs typeface="Consolas" pitchFamily="49" charset="0"/>
+              </a:rPr>
+              <a:t>michael</a:t>
+            </a:r>
+            <a:r>
+              <a:rPr lang="en-US" sz="1800" cap="none" dirty="0" smtClean="0">
+                <a:solidFill>
+                  <a:srgbClr val="0000FF"/>
+                </a:solidFill>
+                <a:latin typeface="Consolas" pitchFamily="49" charset="0"/>
+                <a:cs typeface="Consolas" pitchFamily="49" charset="0"/>
+              </a:rPr>
+              <a:t>”</a:t>
+            </a:r>
+            <a:r>
+              <a:rPr lang="en-US" sz="1800" cap="none" dirty="0" smtClean="0">
+                <a:solidFill>
+                  <a:srgbClr val="000000"/>
+                </a:solidFill>
+                <a:latin typeface="Consolas" pitchFamily="49" charset="0"/>
+                <a:cs typeface="Consolas" pitchFamily="49" charset="0"/>
+              </a:rPr>
+              <a:t>)</a:t>
+            </a:r>
+            <a:endParaRPr lang="en-US" sz="1800" cap="none" dirty="0" smtClean="0">
+              <a:solidFill>
+                <a:srgbClr val="404040"/>
+              </a:solidFill>
+              <a:latin typeface="Consolas" pitchFamily="49" charset="0"/>
+              <a:cs typeface="Consolas" pitchFamily="49" charset="0"/>
+            </a:endParaRPr>
+          </a:p>
+          <a:p>
+            <a:pPr algn="l" rtl="0" eaLnBrk="1" hangingPunct="1">
+              <a:buFontTx/>
+              <a:buNone/>
+            </a:pPr>
+            <a:r>
+              <a:rPr lang="en-US" sz="1800" cap="none" dirty="0" smtClean="0">
+                <a:solidFill>
+                  <a:srgbClr val="404040"/>
+                </a:solidFill>
+                <a:cs typeface="Consolas" pitchFamily="49" charset="0"/>
+              </a:rPr>
+              <a:t>    </a:t>
+            </a:r>
+            <a:r>
+              <a:rPr lang="en-US" sz="1800" cap="none" dirty="0" smtClean="0">
+                <a:solidFill>
+                  <a:srgbClr val="000000"/>
+                </a:solidFill>
+                <a:latin typeface="Consolas" pitchFamily="49" charset="0"/>
+                <a:cs typeface="Consolas" pitchFamily="49" charset="0"/>
+              </a:rPr>
+              <a:t>.</a:t>
+            </a:r>
+            <a:r>
+              <a:rPr lang="en-US" sz="1800" cap="none" dirty="0" err="1" smtClean="0">
+                <a:solidFill>
+                  <a:srgbClr val="000000"/>
+                </a:solidFill>
+                <a:latin typeface="Consolas" pitchFamily="49" charset="0"/>
+                <a:cs typeface="Consolas" pitchFamily="49" charset="0"/>
+              </a:rPr>
+              <a:t>ToArray</a:t>
+            </a:r>
+            <a:r>
+              <a:rPr lang="en-US" sz="1800" cap="none" dirty="0" smtClean="0">
+                <a:solidFill>
+                  <a:srgbClr val="000000"/>
+                </a:solidFill>
+                <a:latin typeface="Consolas" pitchFamily="49" charset="0"/>
+                <a:cs typeface="Consolas" pitchFamily="49" charset="0"/>
+              </a:rPr>
+              <a:t>();</a:t>
+            </a:r>
+          </a:p>
+          <a:p>
+            <a:pPr algn="l" rtl="0" eaLnBrk="1" hangingPunct="1">
+              <a:buFontTx/>
+              <a:buNone/>
+            </a:pPr>
+            <a:endParaRPr lang="en-US" sz="1800" cap="none" dirty="0" smtClean="0">
+              <a:solidFill>
+                <a:srgbClr val="000000"/>
+              </a:solidFill>
+              <a:latin typeface="Consolas" pitchFamily="49" charset="0"/>
+              <a:cs typeface="Consolas" pitchFamily="49" charset="0"/>
+            </a:endParaRPr>
+          </a:p>
+          <a:p>
+            <a:pPr marL="0" indent="0" algn="l" rtl="0">
+              <a:buNone/>
+            </a:pPr>
+            <a:r>
+              <a:rPr lang="en-US" sz="1800" cap="none" dirty="0" err="1" smtClean="0">
+                <a:solidFill>
+                  <a:srgbClr val="000000"/>
+                </a:solidFill>
+                <a:latin typeface="Consolas" pitchFamily="49" charset="0"/>
+                <a:cs typeface="Consolas" pitchFamily="49" charset="0"/>
+              </a:rPr>
+              <a:t>var</a:t>
+            </a:r>
+            <a:r>
+              <a:rPr lang="en-US" sz="1800" cap="none" dirty="0" smtClean="0">
                 <a:solidFill>
                   <a:srgbClr val="000000"/>
                 </a:solidFill>
@@ -17701,137 +18157,17 @@
               <a:t> </a:t>
             </a:r>
             <a:r>
-              <a:rPr lang="en-US" sz="1800" dirty="0">
+              <a:rPr lang="en-US" sz="1800" cap="none" dirty="0" err="1" smtClean="0">
                 <a:solidFill>
                   <a:srgbClr val="000000"/>
                 </a:solidFill>
                 <a:latin typeface="Consolas" pitchFamily="49" charset="0"/>
                 <a:cs typeface="Consolas" pitchFamily="49" charset="0"/>
               </a:rPr>
-              <a:t>== </a:t>
-            </a:r>
-            <a:r>
-              <a:rPr lang="en-US" sz="1800" dirty="0" smtClean="0">
-                <a:solidFill>
-                  <a:srgbClr val="0000FF"/>
-                </a:solidFill>
-                <a:latin typeface="Consolas" pitchFamily="49" charset="0"/>
-                <a:cs typeface="Consolas" pitchFamily="49" charset="0"/>
-              </a:rPr>
-              <a:t>“MICHAEL”</a:t>
-            </a:r>
-            <a:r>
-              <a:rPr lang="en-US" sz="1800" dirty="0" smtClean="0">
-                <a:solidFill>
-                  <a:srgbClr val="000000"/>
-                </a:solidFill>
-                <a:latin typeface="Consolas" pitchFamily="49" charset="0"/>
-                <a:cs typeface="Consolas" pitchFamily="49" charset="0"/>
-              </a:rPr>
-              <a:t>)</a:t>
-            </a:r>
-            <a:endParaRPr lang="en-US" sz="1800" dirty="0">
-              <a:solidFill>
-                <a:srgbClr val="404040"/>
-              </a:solidFill>
-              <a:latin typeface="Consolas" pitchFamily="49" charset="0"/>
-              <a:cs typeface="Consolas" pitchFamily="49" charset="0"/>
-            </a:endParaRPr>
-          </a:p>
-          <a:p>
-            <a:pPr algn="l" rtl="0" eaLnBrk="1" hangingPunct="1">
-              <a:buFontTx/>
-              <a:buNone/>
-            </a:pPr>
-            <a:r>
-              <a:rPr lang="en-US" sz="1800" dirty="0">
-                <a:solidFill>
-                  <a:srgbClr val="404040"/>
-                </a:solidFill>
-                <a:cs typeface="Consolas" pitchFamily="49" charset="0"/>
-              </a:rPr>
-              <a:t>    </a:t>
-            </a:r>
-            <a:r>
-              <a:rPr lang="en-US" sz="1800" dirty="0">
-                <a:solidFill>
-                  <a:srgbClr val="000000"/>
-                </a:solidFill>
-                <a:latin typeface="Consolas" pitchFamily="49" charset="0"/>
-                <a:cs typeface="Consolas" pitchFamily="49" charset="0"/>
-              </a:rPr>
-              <a:t>.</a:t>
-            </a:r>
-            <a:r>
-              <a:rPr lang="en-US" sz="1800" dirty="0" err="1">
-                <a:solidFill>
-                  <a:srgbClr val="000000"/>
-                </a:solidFill>
-                <a:latin typeface="Consolas" pitchFamily="49" charset="0"/>
-                <a:cs typeface="Consolas" pitchFamily="49" charset="0"/>
-              </a:rPr>
-              <a:t>ToArray</a:t>
-            </a:r>
-            <a:r>
-              <a:rPr lang="en-US" sz="1800" dirty="0">
-                <a:solidFill>
-                  <a:srgbClr val="000000"/>
-                </a:solidFill>
-                <a:latin typeface="Consolas" pitchFamily="49" charset="0"/>
-                <a:cs typeface="Consolas" pitchFamily="49" charset="0"/>
-              </a:rPr>
-              <a:t>();</a:t>
-            </a:r>
-          </a:p>
-          <a:p>
-            <a:pPr algn="l" rtl="0" eaLnBrk="1" hangingPunct="1">
-              <a:buFontTx/>
-              <a:buNone/>
-            </a:pPr>
-            <a:endParaRPr lang="en-US" sz="1800" dirty="0">
-              <a:solidFill>
-                <a:srgbClr val="000000"/>
-              </a:solidFill>
-              <a:latin typeface="Consolas" pitchFamily="49" charset="0"/>
-              <a:cs typeface="Consolas" pitchFamily="49" charset="0"/>
-            </a:endParaRPr>
-          </a:p>
-          <a:p>
-            <a:pPr marL="0" indent="0" algn="l" rtl="0">
-              <a:buNone/>
-            </a:pPr>
-            <a:r>
-              <a:rPr lang="en-US" sz="1800" dirty="0" err="1">
-                <a:solidFill>
-                  <a:srgbClr val="000000"/>
-                </a:solidFill>
-                <a:latin typeface="Consolas" pitchFamily="49" charset="0"/>
-                <a:cs typeface="Consolas" pitchFamily="49" charset="0"/>
-              </a:rPr>
-              <a:t>var</a:t>
-            </a:r>
-            <a:r>
-              <a:rPr lang="en-US" sz="1800" dirty="0">
-                <a:solidFill>
-                  <a:srgbClr val="000000"/>
-                </a:solidFill>
-                <a:latin typeface="Consolas" pitchFamily="49" charset="0"/>
-                <a:cs typeface="Consolas" pitchFamily="49" charset="0"/>
-              </a:rPr>
-              <a:t> </a:t>
-            </a:r>
-            <a:r>
-              <a:rPr lang="en-US" sz="1800" dirty="0" err="1">
-                <a:solidFill>
-                  <a:srgbClr val="000000"/>
-                </a:solidFill>
-                <a:latin typeface="Consolas" pitchFamily="49" charset="0"/>
-                <a:cs typeface="Consolas" pitchFamily="49" charset="0"/>
-              </a:rPr>
-              <a:t>totalResutls</a:t>
-            </a:r>
-            <a:r>
-              <a:rPr lang="en-US" sz="1800" dirty="0">
+              <a:t>totalresutls</a:t>
+            </a:r>
+            <a:r>
+              <a:rPr lang="en-US" sz="1800" cap="none" dirty="0" smtClean="0">
                 <a:solidFill>
                   <a:srgbClr val="000000"/>
                 </a:solidFill>
@@ -17841,7 +18177,7 @@
               <a:t> = </a:t>
             </a:r>
             <a:r>
-              <a:rPr lang="en-US" sz="1800" dirty="0" err="1">
+              <a:rPr lang="en-US" sz="1800" cap="none" dirty="0" err="1" smtClean="0">
                 <a:solidFill>
                   <a:srgbClr val="000000"/>
                 </a:solidFill>
@@ -17851,7 +18187,7 @@
               <a:t>stats.TotalResults</a:t>
             </a:r>
             <a:r>
-              <a:rPr lang="en-US" sz="1800" dirty="0" smtClean="0">
+              <a:rPr lang="en-US" sz="1800" cap="none" dirty="0" smtClean="0">
                 <a:solidFill>
                   <a:srgbClr val="000000"/>
                 </a:solidFill>
@@ -17860,7 +18196,7 @@
               </a:rPr>
               <a:t>;</a:t>
             </a:r>
-            <a:endParaRPr lang="en-US" sz="1800" dirty="0">
+            <a:endParaRPr lang="en-US" sz="1800" cap="none" dirty="0">
               <a:solidFill>
                 <a:srgbClr val="000000"/>
               </a:solidFill>
@@ -22770,12 +23106,16 @@
             <a:graphicFrameLocks noGrp="1"/>
           </p:cNvGraphicFramePr>
           <p:nvPr>
-            <p:extLst/>
+            <p:extLst>
+              <p:ext uri="{D42A27DB-BD31-4B8C-83A1-F6EECF244321}">
+                <p14:modId xmlns:p14="http://schemas.microsoft.com/office/powerpoint/2010/main" val="613664154"/>
+              </p:ext>
+            </p:extLst>
           </p:nvPr>
         </p:nvGraphicFramePr>
         <p:xfrm>
-          <a:off x="8929221" y="750814"/>
-          <a:ext cx="2797076" cy="5888736"/>
+          <a:off x="9215824" y="136665"/>
+          <a:ext cx="2797076" cy="6449568"/>
         </p:xfrm>
         <a:graphic>
           <a:graphicData uri="http://schemas.openxmlformats.org/drawingml/2006/table">
@@ -22832,12 +23172,12 @@
                         </a:spcAft>
                       </a:pPr>
                       <a:r>
-                        <a:rPr lang="en-US" sz="1600">
+                        <a:rPr lang="en-US" sz="1600" dirty="0" err="1">
                           <a:effectLst/>
                         </a:rPr>
                         <a:t>Freq</a:t>
                       </a:r>
-                      <a:endParaRPr lang="en-US" sz="1100">
+                      <a:endParaRPr lang="en-US" sz="1100" dirty="0">
                         <a:effectLst/>
                         <a:latin typeface="Calibri"/>
                         <a:ea typeface="Calibri"/>
@@ -23544,12 +23884,12 @@
                         </a:spcAft>
                       </a:pPr>
                       <a:r>
-                        <a:rPr lang="en-US" sz="1600">
+                        <a:rPr lang="en-US" sz="1600" dirty="0">
                           <a:effectLst/>
                         </a:rPr>
                         <a:t>5</a:t>
                       </a:r>
-                      <a:endParaRPr lang="en-US" sz="1100">
+                      <a:endParaRPr lang="en-US" sz="1100" dirty="0">
                         <a:effectLst/>
                         <a:latin typeface="Calibri"/>
                         <a:ea typeface="Calibri"/>
@@ -24612,12 +24952,12 @@
                         </a:spcAft>
                       </a:pPr>
                       <a:r>
-                        <a:rPr lang="en-US" sz="1600">
+                        <a:rPr lang="en-US" sz="1600" dirty="0">
                           <a:effectLst/>
                         </a:rPr>
                         <a:t>1</a:t>
                       </a:r>
-                      <a:endParaRPr lang="en-US" sz="1100">
+                      <a:endParaRPr lang="en-US" sz="1100" dirty="0">
                         <a:effectLst/>
                         <a:latin typeface="Calibri"/>
                         <a:ea typeface="Calibri"/>
@@ -24851,7 +25191,7 @@
         </p:nvGraphicFramePr>
         <p:xfrm>
           <a:off x="542935" y="2264735"/>
-          <a:ext cx="5825967" cy="2383536"/>
+          <a:ext cx="5825967" cy="3329940"/>
         </p:xfrm>
         <a:graphic>
           <a:graphicData uri="http://schemas.openxmlformats.org/drawingml/2006/table">
@@ -25443,7 +25783,7 @@
         </p:nvGraphicFramePr>
         <p:xfrm>
           <a:off x="8929221" y="750814"/>
-          <a:ext cx="2797076" cy="5888736"/>
+          <a:ext cx="2797076" cy="6449568"/>
         </p:xfrm>
         <a:graphic>
           <a:graphicData uri="http://schemas.openxmlformats.org/drawingml/2006/table">
@@ -27537,7 +27877,7 @@
         </p:nvGraphicFramePr>
         <p:xfrm>
           <a:off x="542935" y="2264735"/>
-          <a:ext cx="5825967" cy="2383536"/>
+          <a:ext cx="5825967" cy="3329940"/>
         </p:xfrm>
         <a:graphic>
           <a:graphicData uri="http://schemas.openxmlformats.org/drawingml/2006/table">
@@ -28263,7 +28603,7 @@
         </p:nvGraphicFramePr>
         <p:xfrm>
           <a:off x="8929221" y="750814"/>
-          <a:ext cx="2797076" cy="5327904"/>
+          <a:ext cx="2797076" cy="6169152"/>
         </p:xfrm>
         <a:graphic>
           <a:graphicData uri="http://schemas.openxmlformats.org/drawingml/2006/table">
@@ -30176,7 +30516,7 @@
         </p:nvGraphicFramePr>
         <p:xfrm>
           <a:off x="542935" y="2264735"/>
-          <a:ext cx="5825967" cy="2383536"/>
+          <a:ext cx="5825967" cy="3329940"/>
         </p:xfrm>
         <a:graphic>
           <a:graphicData uri="http://schemas.openxmlformats.org/drawingml/2006/table">
@@ -30897,12 +31237,16 @@
             <a:graphicFrameLocks noGrp="1"/>
           </p:cNvGraphicFramePr>
           <p:nvPr>
-            <p:extLst/>
+            <p:extLst>
+              <p:ext uri="{D42A27DB-BD31-4B8C-83A1-F6EECF244321}">
+                <p14:modId xmlns:p14="http://schemas.microsoft.com/office/powerpoint/2010/main" val="526444122"/>
+              </p:ext>
+            </p:extLst>
           </p:nvPr>
         </p:nvGraphicFramePr>
         <p:xfrm>
-          <a:off x="8929221" y="750814"/>
-          <a:ext cx="2797076" cy="5327904"/>
+          <a:off x="8997460" y="464211"/>
+          <a:ext cx="2797076" cy="6169152"/>
         </p:xfrm>
         <a:graphic>
           <a:graphicData uri="http://schemas.openxmlformats.org/drawingml/2006/table">
@@ -32923,7 +33267,7 @@
         </p:nvGraphicFramePr>
         <p:xfrm>
           <a:off x="542935" y="2264735"/>
-          <a:ext cx="5825967" cy="2383536"/>
+          <a:ext cx="5825967" cy="3329940"/>
         </p:xfrm>
         <a:graphic>
           <a:graphicData uri="http://schemas.openxmlformats.org/drawingml/2006/table">
@@ -33684,14 +34028,11 @@
             <a:pPr algn="l" rtl="0"/>
             <a:r>
               <a:rPr lang="en-US" dirty="0" smtClean="0"/>
-              <a:t>Fuzzy – during query</a:t>
-            </a:r>
-          </a:p>
-          <a:p>
-            <a:pPr algn="l" rtl="0"/>
+              <a:t>Suggestions </a:t>
+            </a:r>
             <a:r>
               <a:rPr lang="en-US" dirty="0" smtClean="0"/>
-              <a:t>Suggestions prepared ahead of time</a:t>
+              <a:t>prepared ahead of time</a:t>
             </a:r>
           </a:p>
           <a:p>
@@ -33744,7 +34085,7 @@
             <a:spLocks noGrp="1"/>
           </p:cNvSpPr>
           <p:nvPr>
-            <p:ph type="title"/>
+            <p:ph type="ctrTitle"/>
           </p:nvPr>
         </p:nvSpPr>
         <p:spPr/>
@@ -33754,65 +34095,29 @@
           <a:p>
             <a:r>
               <a:rPr lang="en-US" dirty="0" smtClean="0"/>
-              <a:t>More Like This</a:t>
-            </a:r>
-            <a:endParaRPr lang="en-US" dirty="0"/>
-          </a:p>
-        </p:txBody>
-      </p:sp>
-      <p:sp>
-        <p:nvSpPr>
-          <p:cNvPr id="3" name="Content Placeholder 2"/>
-          <p:cNvSpPr>
-            <a:spLocks noGrp="1"/>
-          </p:cNvSpPr>
-          <p:nvPr>
-            <p:ph sz="quarter" idx="13"/>
-          </p:nvPr>
-        </p:nvSpPr>
-        <p:spPr/>
-        <p:txBody>
-          <a:bodyPr/>
-          <a:lstStyle/>
-          <a:p>
-            <a:pPr algn="l" rtl="0"/>
-            <a:r>
-              <a:rPr lang="en-US" dirty="0" smtClean="0"/>
-              <a:t>Recommendations</a:t>
-            </a:r>
-          </a:p>
-          <a:p>
-            <a:pPr algn="l" rtl="0"/>
-            <a:r>
-              <a:rPr lang="en-US" dirty="0" smtClean="0"/>
-              <a:t>Terms </a:t>
-            </a:r>
-            <a:r>
-              <a:rPr lang="en-US" dirty="0" err="1" smtClean="0"/>
-              <a:t>Freq</a:t>
-            </a:r>
-            <a:endParaRPr lang="en-US" dirty="0" smtClean="0"/>
-          </a:p>
-          <a:p>
-            <a:pPr algn="l" rtl="0"/>
-            <a:endParaRPr lang="en-US" dirty="0" smtClean="0"/>
-          </a:p>
-          <a:p>
-            <a:pPr algn="l" rtl="0"/>
-            <a:endParaRPr lang="en-US" dirty="0"/>
+              <a:t>Indexing – SPATIAL INDEX</a:t>
+            </a:r>
+            <a:endParaRPr lang="he-IL" dirty="0"/>
           </a:p>
         </p:txBody>
       </p:sp>
     </p:spTree>
     <p:extLst>
       <p:ext uri="{BB962C8B-B14F-4D97-AF65-F5344CB8AC3E}">
-        <p14:creationId xmlns:p14="http://schemas.microsoft.com/office/powerpoint/2010/main" val="2002272285"/>
+        <p14:creationId xmlns:p14="http://schemas.microsoft.com/office/powerpoint/2010/main" val="2075534187"/>
       </p:ext>
     </p:extLst>
   </p:cSld>
   <p:clrMapOvr>
     <a:masterClrMapping/>
   </p:clrMapOvr>
+  <p:timing>
+    <p:tnLst>
+      <p:par>
+        <p:cTn id="1" dur="indefinite" restart="never" nodeType="tmRoot"/>
+      </p:par>
+    </p:tnLst>
+  </p:timing>
 </p:sld>
 </file>
 
@@ -33959,7 +34264,7 @@
             <a:spLocks noGrp="1"/>
           </p:cNvSpPr>
           <p:nvPr>
-            <p:ph type="ctrTitle"/>
+            <p:ph type="title"/>
           </p:nvPr>
         </p:nvSpPr>
         <p:spPr/>
@@ -33969,7 +34274,38 @@
           <a:p>
             <a:r>
               <a:rPr lang="en-US" dirty="0" smtClean="0"/>
-              <a:t>Indexing – SPATIAL INDEX</a:t>
+              <a:t>Spatial is..</a:t>
+            </a:r>
+            <a:endParaRPr lang="he-IL" dirty="0"/>
+          </a:p>
+        </p:txBody>
+      </p:sp>
+      <p:sp>
+        <p:nvSpPr>
+          <p:cNvPr id="3" name="Content Placeholder 2"/>
+          <p:cNvSpPr>
+            <a:spLocks noGrp="1"/>
+          </p:cNvSpPr>
+          <p:nvPr>
+            <p:ph sz="quarter" idx="13"/>
+          </p:nvPr>
+        </p:nvSpPr>
+        <p:spPr/>
+        <p:txBody>
+          <a:bodyPr/>
+          <a:lstStyle/>
+          <a:p>
+            <a:pPr algn="l" rtl="0"/>
+            <a:r>
+              <a:rPr lang="en-US" dirty="0" smtClean="0"/>
+              <a:t>Making queries on a map</a:t>
+            </a:r>
+          </a:p>
+          <a:p>
+            <a:pPr algn="l" rtl="0"/>
+            <a:r>
+              <a:rPr lang="en-US" dirty="0" smtClean="0"/>
+              <a:t>Handled by Lucene</a:t>
             </a:r>
             <a:endParaRPr lang="he-IL" dirty="0"/>
           </a:p>
@@ -33978,20 +34314,13 @@
     </p:spTree>
     <p:extLst>
       <p:ext uri="{BB962C8B-B14F-4D97-AF65-F5344CB8AC3E}">
-        <p14:creationId xmlns:p14="http://schemas.microsoft.com/office/powerpoint/2010/main" val="2075534187"/>
+        <p14:creationId xmlns:p14="http://schemas.microsoft.com/office/powerpoint/2010/main" val="3989974253"/>
       </p:ext>
     </p:extLst>
   </p:cSld>
   <p:clrMapOvr>
     <a:masterClrMapping/>
   </p:clrMapOvr>
-  <p:timing>
-    <p:tnLst>
-      <p:par>
-        <p:cTn id="1" dur="indefinite" restart="never" nodeType="tmRoot"/>
-      </p:par>
-    </p:tnLst>
-  </p:timing>
 </p:sld>
 </file>
 
@@ -34029,9 +34358,9 @@
           <a:p>
             <a:r>
               <a:rPr lang="en-US" dirty="0" smtClean="0"/>
-              <a:t>Spatial is..</a:t>
-            </a:r>
-            <a:endParaRPr lang="he-IL" dirty="0"/>
+              <a:t>Spatial Queries</a:t>
+            </a:r>
+            <a:endParaRPr lang="en-US" dirty="0"/>
           </a:p>
         </p:txBody>
       </p:sp>
@@ -34053,23 +34382,59 @@
             <a:pPr algn="l" rtl="0"/>
             <a:r>
               <a:rPr lang="en-US" dirty="0" smtClean="0"/>
-              <a:t>Making queries on a map</a:t>
+              <a:t>Support for queries on geometries defined in Simple </a:t>
+            </a:r>
+            <a:r>
+              <a:rPr lang="en-US" dirty="0"/>
+              <a:t>Features specification (</a:t>
+            </a:r>
+            <a:r>
+              <a:rPr lang="en-US" dirty="0">
+                <a:hlinkClick r:id="rId2"/>
+              </a:rPr>
+              <a:t>http://</a:t>
+            </a:r>
+            <a:r>
+              <a:rPr lang="en-US" dirty="0" smtClean="0">
+                <a:hlinkClick r:id="rId2"/>
+              </a:rPr>
+              <a:t>en.wikipedia.org/wiki/Simple_Features</a:t>
+            </a:r>
+            <a:r>
+              <a:rPr lang="en-US" dirty="0" smtClean="0"/>
+              <a:t> --&gt; Open Geospatial Consortium and ISO standard)</a:t>
+            </a:r>
+          </a:p>
+          <a:p>
+            <a:pPr lvl="1" algn="l" rtl="0"/>
+            <a:r>
+              <a:rPr lang="en-US" dirty="0" smtClean="0"/>
+              <a:t>Points, Circles, Polygons</a:t>
+            </a:r>
+          </a:p>
+          <a:p>
+            <a:pPr lvl="1" algn="l" rtl="0"/>
+            <a:r>
+              <a:rPr lang="en-US" dirty="0" smtClean="0"/>
+              <a:t>WKT (Well-known Text markup)</a:t>
             </a:r>
           </a:p>
           <a:p>
             <a:pPr algn="l" rtl="0"/>
-            <a:r>
-              <a:rPr lang="en-US" dirty="0" smtClean="0"/>
-              <a:t>Handled by Lucene</a:t>
-            </a:r>
-            <a:endParaRPr lang="he-IL" dirty="0"/>
+            <a:endParaRPr lang="en-US" dirty="0" smtClean="0"/>
+          </a:p>
+          <a:p>
+            <a:pPr marL="457200" lvl="1" indent="0" algn="l" rtl="0">
+              <a:buNone/>
+            </a:pPr>
+            <a:endParaRPr lang="en-US" dirty="0"/>
           </a:p>
         </p:txBody>
       </p:sp>
     </p:spTree>
     <p:extLst>
       <p:ext uri="{BB962C8B-B14F-4D97-AF65-F5344CB8AC3E}">
-        <p14:creationId xmlns:p14="http://schemas.microsoft.com/office/powerpoint/2010/main" val="3989974253"/>
+        <p14:creationId xmlns:p14="http://schemas.microsoft.com/office/powerpoint/2010/main" val="1678351416"/>
       </p:ext>
     </p:extLst>
   </p:cSld>
@@ -34113,83 +34478,40 @@
           <a:p>
             <a:r>
               <a:rPr lang="en-US" dirty="0" smtClean="0"/>
-              <a:t>Spatial Queries</a:t>
+              <a:t>Model</a:t>
             </a:r>
             <a:endParaRPr lang="en-US" dirty="0"/>
           </a:p>
         </p:txBody>
       </p:sp>
-      <p:sp>
-        <p:nvSpPr>
-          <p:cNvPr id="3" name="Content Placeholder 2"/>
-          <p:cNvSpPr>
-            <a:spLocks noGrp="1"/>
-          </p:cNvSpPr>
-          <p:nvPr>
-            <p:ph sz="quarter" idx="13"/>
-          </p:nvPr>
-        </p:nvSpPr>
-        <p:spPr/>
-        <p:txBody>
-          <a:bodyPr/>
-          <a:lstStyle/>
-          <a:p>
-            <a:pPr algn="l" rtl="0"/>
-            <a:r>
-              <a:rPr lang="en-US" dirty="0" smtClean="0"/>
-              <a:t>Support for queries on geometries defined in Simple </a:t>
-            </a:r>
-            <a:r>
-              <a:rPr lang="en-US" dirty="0"/>
-              <a:t>Features specification (</a:t>
-            </a:r>
-            <a:r>
-              <a:rPr lang="en-US" dirty="0">
-                <a:hlinkClick r:id="rId2"/>
-              </a:rPr>
-              <a:t>http://</a:t>
-            </a:r>
-            <a:r>
-              <a:rPr lang="en-US" dirty="0" smtClean="0">
-                <a:hlinkClick r:id="rId2"/>
-              </a:rPr>
-              <a:t>en.wikipedia.org/wiki/Simple_Features</a:t>
-            </a:r>
-            <a:r>
-              <a:rPr lang="en-US" dirty="0" smtClean="0"/>
-              <a:t> --&gt; Open Geospatial Consortium and ISO standard)</a:t>
-            </a:r>
-          </a:p>
-          <a:p>
-            <a:pPr lvl="1" algn="l" rtl="0"/>
-            <a:r>
-              <a:rPr lang="en-US" dirty="0" smtClean="0"/>
-              <a:t>Points, Circles, Polygons</a:t>
-            </a:r>
-          </a:p>
-          <a:p>
-            <a:pPr lvl="1" algn="l" rtl="0"/>
-            <a:r>
-              <a:rPr lang="en-US" dirty="0" smtClean="0"/>
-              <a:t>WKT (Well-known Text markup)</a:t>
-            </a:r>
-          </a:p>
-          <a:p>
-            <a:pPr algn="l" rtl="0"/>
-            <a:endParaRPr lang="en-US" dirty="0" smtClean="0"/>
-          </a:p>
-          <a:p>
-            <a:pPr marL="457200" lvl="1" indent="0" algn="l" rtl="0">
-              <a:buNone/>
-            </a:pPr>
-            <a:endParaRPr lang="en-US" dirty="0"/>
-          </a:p>
-        </p:txBody>
-      </p:sp>
+      <p:pic>
+        <p:nvPicPr>
+          <p:cNvPr id="4" name="Picture 3"/>
+          <p:cNvPicPr>
+            <a:picLocks noChangeAspect="1"/>
+          </p:cNvPicPr>
+          <p:nvPr/>
+        </p:nvPicPr>
+        <p:blipFill>
+          <a:blip r:embed="rId2"/>
+          <a:stretch>
+            <a:fillRect/>
+          </a:stretch>
+        </p:blipFill>
+        <p:spPr>
+          <a:xfrm>
+            <a:off x="3780200" y="2422070"/>
+            <a:ext cx="4170726" cy="3955217"/>
+          </a:xfrm>
+          <a:prstGeom prst="rect">
+            <a:avLst/>
+          </a:prstGeom>
+        </p:spPr>
+      </p:pic>
     </p:spTree>
     <p:extLst>
       <p:ext uri="{BB962C8B-B14F-4D97-AF65-F5344CB8AC3E}">
-        <p14:creationId xmlns:p14="http://schemas.microsoft.com/office/powerpoint/2010/main" val="1678351416"/>
+        <p14:creationId xmlns:p14="http://schemas.microsoft.com/office/powerpoint/2010/main" val="2337012275"/>
       </p:ext>
     </p:extLst>
   </p:cSld>
@@ -34233,7 +34555,7 @@
           <a:p>
             <a:r>
               <a:rPr lang="en-US" dirty="0" smtClean="0"/>
-              <a:t>Model</a:t>
+              <a:t>Spatial Index</a:t>
             </a:r>
             <a:endParaRPr lang="en-US" dirty="0"/>
           </a:p>
@@ -34248,15 +34570,15 @@
           <p:nvPr/>
         </p:nvPicPr>
         <p:blipFill>
-          <a:blip r:embed="rId2"/>
+          <a:blip r:embed="rId3"/>
           <a:stretch>
             <a:fillRect/>
           </a:stretch>
         </p:blipFill>
         <p:spPr>
           <a:xfrm>
-            <a:off x="3780200" y="2422070"/>
-            <a:ext cx="4170726" cy="3955217"/>
+            <a:off x="2310900" y="1900646"/>
+            <a:ext cx="7764917" cy="3862342"/>
           </a:xfrm>
           <a:prstGeom prst="rect">
             <a:avLst/>
@@ -34266,7 +34588,7 @@
     </p:spTree>
     <p:extLst>
       <p:ext uri="{BB962C8B-B14F-4D97-AF65-F5344CB8AC3E}">
-        <p14:creationId xmlns:p14="http://schemas.microsoft.com/office/powerpoint/2010/main" val="2337012275"/>
+        <p14:creationId xmlns:p14="http://schemas.microsoft.com/office/powerpoint/2010/main" val="999000305"/>
       </p:ext>
     </p:extLst>
   </p:cSld>
@@ -34310,7 +34632,7 @@
           <a:p>
             <a:r>
               <a:rPr lang="en-US" dirty="0" smtClean="0"/>
-              <a:t>Spatial Index</a:t>
+              <a:t>Spatial Query 1</a:t>
             </a:r>
             <a:endParaRPr lang="en-US" dirty="0"/>
           </a:p>
@@ -34318,7 +34640,7 @@
       </p:sp>
       <p:pic>
         <p:nvPicPr>
-          <p:cNvPr id="4" name="Picture 3"/>
+          <p:cNvPr id="5" name="Picture 4"/>
           <p:cNvPicPr>
             <a:picLocks noChangeAspect="1"/>
           </p:cNvPicPr>
@@ -34332,8 +34654,8 @@
         </p:blipFill>
         <p:spPr>
           <a:xfrm>
-            <a:off x="2310900" y="1900646"/>
-            <a:ext cx="7764917" cy="3862342"/>
+            <a:off x="1605986" y="2214694"/>
+            <a:ext cx="9672240" cy="2669858"/>
           </a:xfrm>
           <a:prstGeom prst="rect">
             <a:avLst/>
@@ -34343,7 +34665,7 @@
     </p:spTree>
     <p:extLst>
       <p:ext uri="{BB962C8B-B14F-4D97-AF65-F5344CB8AC3E}">
-        <p14:creationId xmlns:p14="http://schemas.microsoft.com/office/powerpoint/2010/main" val="999000305"/>
+        <p14:creationId xmlns:p14="http://schemas.microsoft.com/office/powerpoint/2010/main" val="3412313537"/>
       </p:ext>
     </p:extLst>
   </p:cSld>
@@ -34387,83 +34709,6 @@
           <a:p>
             <a:r>
               <a:rPr lang="en-US" dirty="0" smtClean="0"/>
-              <a:t>Spatial Query 1</a:t>
-            </a:r>
-            <a:endParaRPr lang="en-US" dirty="0"/>
-          </a:p>
-        </p:txBody>
-      </p:sp>
-      <p:pic>
-        <p:nvPicPr>
-          <p:cNvPr id="5" name="Picture 4"/>
-          <p:cNvPicPr>
-            <a:picLocks noChangeAspect="1"/>
-          </p:cNvPicPr>
-          <p:nvPr/>
-        </p:nvPicPr>
-        <p:blipFill>
-          <a:blip r:embed="rId2"/>
-          <a:stretch>
-            <a:fillRect/>
-          </a:stretch>
-        </p:blipFill>
-        <p:spPr>
-          <a:xfrm>
-            <a:off x="1605986" y="2214694"/>
-            <a:ext cx="9672240" cy="2669858"/>
-          </a:xfrm>
-          <a:prstGeom prst="rect">
-            <a:avLst/>
-          </a:prstGeom>
-        </p:spPr>
-      </p:pic>
-    </p:spTree>
-    <p:extLst>
-      <p:ext uri="{BB962C8B-B14F-4D97-AF65-F5344CB8AC3E}">
-        <p14:creationId xmlns:p14="http://schemas.microsoft.com/office/powerpoint/2010/main" val="3412313537"/>
-      </p:ext>
-    </p:extLst>
-  </p:cSld>
-  <p:clrMapOvr>
-    <a:masterClrMapping/>
-  </p:clrMapOvr>
-</p:sld>
-</file>
-
-<file path=ppt/slides/slide46.xml><?xml version="1.0" encoding="utf-8"?>
-<p:sld xmlns:a="http://schemas.openxmlformats.org/drawingml/2006/main" xmlns:r="http://schemas.openxmlformats.org/officeDocument/2006/relationships" xmlns:p="http://schemas.openxmlformats.org/presentationml/2006/main">
-  <p:cSld>
-    <p:spTree>
-      <p:nvGrpSpPr>
-        <p:cNvPr id="1" name=""/>
-        <p:cNvGrpSpPr/>
-        <p:nvPr/>
-      </p:nvGrpSpPr>
-      <p:grpSpPr>
-        <a:xfrm>
-          <a:off x="0" y="0"/>
-          <a:ext cx="0" cy="0"/>
-          <a:chOff x="0" y="0"/>
-          <a:chExt cx="0" cy="0"/>
-        </a:xfrm>
-      </p:grpSpPr>
-      <p:sp>
-        <p:nvSpPr>
-          <p:cNvPr id="2" name="Title 1"/>
-          <p:cNvSpPr>
-            <a:spLocks noGrp="1"/>
-          </p:cNvSpPr>
-          <p:nvPr>
-            <p:ph type="title"/>
-          </p:nvPr>
-        </p:nvSpPr>
-        <p:spPr/>
-        <p:txBody>
-          <a:bodyPr/>
-          <a:lstStyle/>
-          <a:p>
-            <a:r>
-              <a:rPr lang="en-US" dirty="0" smtClean="0"/>
               <a:t>Spatial Query 2</a:t>
             </a:r>
             <a:endParaRPr lang="en-US" dirty="0"/>
@@ -34507,7 +34752,7 @@
 </p:sld>
 </file>
 
-<file path=ppt/slides/slide47.xml><?xml version="1.0" encoding="utf-8"?>
+<file path=ppt/slides/slide46.xml><?xml version="1.0" encoding="utf-8"?>
 <p:sld xmlns:a="http://schemas.openxmlformats.org/drawingml/2006/main" xmlns:r="http://schemas.openxmlformats.org/officeDocument/2006/relationships" xmlns:p="http://schemas.openxmlformats.org/presentationml/2006/main">
   <p:cSld>
     <p:spTree>
@@ -35055,7 +35300,7 @@
         </p:nvGraphicFramePr>
         <p:xfrm>
           <a:off x="6023991" y="5229200"/>
-          <a:ext cx="4283970" cy="949960"/>
+          <a:ext cx="4283970" cy="1280160"/>
         </p:xfrm>
         <a:graphic>
           <a:graphicData uri="http://schemas.openxmlformats.org/drawingml/2006/table">
@@ -35758,7 +36003,7 @@
         </p:nvGraphicFramePr>
         <p:xfrm>
           <a:off x="712519" y="4282995"/>
-          <a:ext cx="4283970" cy="949960"/>
+          <a:ext cx="4283970" cy="1280160"/>
         </p:xfrm>
         <a:graphic>
           <a:graphicData uri="http://schemas.openxmlformats.org/drawingml/2006/table">
@@ -36673,7 +36918,7 @@
         </p:nvGraphicFramePr>
         <p:xfrm>
           <a:off x="6087601" y="5030418"/>
-          <a:ext cx="4283970" cy="1651000"/>
+          <a:ext cx="4283970" cy="1920240"/>
         </p:xfrm>
         <a:graphic>
           <a:graphicData uri="http://schemas.openxmlformats.org/drawingml/2006/table">

</xml_diff>